<commit_message>
Incorporated several of Otsuya-san's recommended improvements
</commit_message>
<xml_diff>
--- a/skyway-renewal-inception-deck.pptx
+++ b/skyway-renewal-inception-deck.pptx
@@ -219,7 +219,7 @@
             <a:fld id="{08A6A601-9B1B-438A-96A6-56431C4BA801}" type="datetimeFigureOut">
               <a:rPr lang="en-CA" smtClean="0"/>
               <a:pPr/>
-              <a:t>2015-05-27</a:t>
+              <a:t>2015-06-05</a:t>
             </a:fld>
             <a:endParaRPr lang="en-CA"/>
           </a:p>
@@ -1752,7 +1752,7 @@
             <a:fld id="{1D8BD707-D9CF-40AE-B4C6-C98DA3205C09}" type="datetimeFigureOut">
               <a:rPr lang="en-US" smtClean="0"/>
               <a:pPr/>
-              <a:t>5/27/15</a:t>
+              <a:t>6/5/15</a:t>
             </a:fld>
             <a:endParaRPr lang="en-US"/>
           </a:p>
@@ -1951,7 +1951,7 @@
             <a:fld id="{1D8BD707-D9CF-40AE-B4C6-C98DA3205C09}" type="datetimeFigureOut">
               <a:rPr lang="en-US" smtClean="0"/>
               <a:pPr/>
-              <a:t>5/27/15</a:t>
+              <a:t>6/5/15</a:t>
             </a:fld>
             <a:endParaRPr lang="en-US"/>
           </a:p>
@@ -2128,7 +2128,7 @@
             <a:fld id="{1D8BD707-D9CF-40AE-B4C6-C98DA3205C09}" type="datetimeFigureOut">
               <a:rPr lang="en-US" smtClean="0"/>
               <a:pPr/>
-              <a:t>5/27/15</a:t>
+              <a:t>6/5/15</a:t>
             </a:fld>
             <a:endParaRPr lang="en-US"/>
           </a:p>
@@ -2295,7 +2295,7 @@
             <a:fld id="{1D8BD707-D9CF-40AE-B4C6-C98DA3205C09}" type="datetimeFigureOut">
               <a:rPr lang="en-US" smtClean="0"/>
               <a:pPr/>
-              <a:t>5/27/15</a:t>
+              <a:t>6/5/15</a:t>
             </a:fld>
             <a:endParaRPr lang="en-US"/>
           </a:p>
@@ -2538,7 +2538,7 @@
             <a:fld id="{1D8BD707-D9CF-40AE-B4C6-C98DA3205C09}" type="datetimeFigureOut">
               <a:rPr lang="en-US" smtClean="0"/>
               <a:pPr/>
-              <a:t>5/27/15</a:t>
+              <a:t>6/5/15</a:t>
             </a:fld>
             <a:endParaRPr lang="en-US"/>
           </a:p>
@@ -2823,7 +2823,7 @@
             <a:fld id="{1D8BD707-D9CF-40AE-B4C6-C98DA3205C09}" type="datetimeFigureOut">
               <a:rPr lang="en-US" smtClean="0"/>
               <a:pPr/>
-              <a:t>5/27/15</a:t>
+              <a:t>6/5/15</a:t>
             </a:fld>
             <a:endParaRPr lang="en-US"/>
           </a:p>
@@ -3242,7 +3242,7 @@
             <a:fld id="{1D8BD707-D9CF-40AE-B4C6-C98DA3205C09}" type="datetimeFigureOut">
               <a:rPr lang="en-US" smtClean="0"/>
               <a:pPr/>
-              <a:t>5/27/15</a:t>
+              <a:t>6/5/15</a:t>
             </a:fld>
             <a:endParaRPr lang="en-US"/>
           </a:p>
@@ -3357,7 +3357,7 @@
             <a:fld id="{1D8BD707-D9CF-40AE-B4C6-C98DA3205C09}" type="datetimeFigureOut">
               <a:rPr lang="en-US" smtClean="0"/>
               <a:pPr/>
-              <a:t>5/27/15</a:t>
+              <a:t>6/5/15</a:t>
             </a:fld>
             <a:endParaRPr lang="en-US"/>
           </a:p>
@@ -3449,7 +3449,7 @@
             <a:fld id="{1D8BD707-D9CF-40AE-B4C6-C98DA3205C09}" type="datetimeFigureOut">
               <a:rPr lang="en-US" smtClean="0"/>
               <a:pPr/>
-              <a:t>5/27/15</a:t>
+              <a:t>6/5/15</a:t>
             </a:fld>
             <a:endParaRPr lang="en-US"/>
           </a:p>
@@ -3723,7 +3723,7 @@
             <a:fld id="{1D8BD707-D9CF-40AE-B4C6-C98DA3205C09}" type="datetimeFigureOut">
               <a:rPr lang="en-US" smtClean="0"/>
               <a:pPr/>
-              <a:t>5/27/15</a:t>
+              <a:t>6/5/15</a:t>
             </a:fld>
             <a:endParaRPr lang="en-US"/>
           </a:p>
@@ -3973,7 +3973,7 @@
             <a:fld id="{1D8BD707-D9CF-40AE-B4C6-C98DA3205C09}" type="datetimeFigureOut">
               <a:rPr lang="en-US" smtClean="0"/>
               <a:pPr/>
-              <a:t>5/27/15</a:t>
+              <a:t>6/5/15</a:t>
             </a:fld>
             <a:endParaRPr lang="en-US"/>
           </a:p>
@@ -4183,7 +4183,7 @@
             <a:fld id="{1D8BD707-D9CF-40AE-B4C6-C98DA3205C09}" type="datetimeFigureOut">
               <a:rPr lang="en-US" smtClean="0"/>
               <a:pPr/>
-              <a:t>5/27/15</a:t>
+              <a:t>6/5/15</a:t>
             </a:fld>
             <a:endParaRPr lang="en-US"/>
           </a:p>
@@ -5097,11 +5097,6 @@
               </a:rPr>
               <a:t>2 weeks</a:t>
             </a:r>
-            <a:endParaRPr lang="en-CA" altLang="ja-JP" sz="2800" dirty="0">
-              <a:solidFill>
-                <a:schemeClr val="bg1"/>
-              </a:solidFill>
-            </a:endParaRPr>
           </a:p>
         </p:txBody>
       </p:sp>
@@ -5135,11 +5130,6 @@
               </a:rPr>
               <a:t>2 weeks</a:t>
             </a:r>
-            <a:endParaRPr lang="en-CA" altLang="ja-JP" sz="2800" dirty="0">
-              <a:solidFill>
-                <a:schemeClr val="bg1"/>
-              </a:solidFill>
-            </a:endParaRPr>
           </a:p>
         </p:txBody>
       </p:sp>
@@ -7944,8 +7934,8 @@
         </p:blipFill>
         <p:spPr bwMode="auto">
           <a:xfrm>
-            <a:off x="990600" y="4953000"/>
-            <a:ext cx="7388225" cy="1512168"/>
+            <a:off x="304800" y="4952999"/>
+            <a:ext cx="8686800" cy="1777951"/>
           </a:xfrm>
           <a:prstGeom prst="rect">
             <a:avLst/>
@@ -7992,30 +7982,65 @@
             <p:ph idx="1"/>
           </p:nvPr>
         </p:nvSpPr>
-        <p:spPr/>
-        <p:txBody>
-          <a:bodyPr/>
-          <a:lstStyle/>
-          <a:p>
-            <a:r>
-              <a:rPr lang="en-CA" dirty="0" smtClean="0"/>
-              <a:t>To revamp the </a:t>
-            </a:r>
-            <a:r>
-              <a:rPr lang="en-CA" dirty="0" err="1" smtClean="0"/>
+        <p:spPr>
+          <a:xfrm>
+            <a:off x="457200" y="1524000"/>
+            <a:ext cx="8229600" cy="4525963"/>
+          </a:xfrm>
+        </p:spPr>
+        <p:txBody>
+          <a:bodyPr>
+            <a:normAutofit/>
+          </a:bodyPr>
+          <a:lstStyle/>
+          <a:p>
+            <a:r>
+              <a:rPr lang="en-CA" sz="2400" dirty="0" smtClean="0"/>
+              <a:t>To clearly present the purpose and strengths of </a:t>
+            </a:r>
+            <a:r>
+              <a:rPr lang="en-CA" sz="2400" dirty="0" err="1" smtClean="0"/>
               <a:t>SkyWay</a:t>
             </a:r>
             <a:r>
-              <a:rPr lang="en-CA" dirty="0" smtClean="0"/>
+              <a:rPr lang="en-CA" sz="2400" dirty="0" smtClean="0"/>
+              <a:t> to developers.</a:t>
+            </a:r>
+          </a:p>
+          <a:p>
+            <a:r>
+              <a:rPr lang="en-CA" sz="2400" dirty="0" smtClean="0"/>
+              <a:t>To </a:t>
+            </a:r>
+            <a:r>
+              <a:rPr lang="en-CA" sz="2400" dirty="0" smtClean="0"/>
+              <a:t>revamp the </a:t>
+            </a:r>
+            <a:r>
+              <a:rPr lang="en-CA" sz="2400" dirty="0" err="1" smtClean="0"/>
+              <a:t>SkyWay</a:t>
+            </a:r>
+            <a:r>
+              <a:rPr lang="en-CA" sz="2400" dirty="0" smtClean="0"/>
               <a:t> website to a fresh and appealing design</a:t>
             </a:r>
-            <a:endParaRPr lang="en-CA" dirty="0" smtClean="0"/>
-          </a:p>
-          <a:p>
-            <a:r>
-              <a:rPr lang="en-CA" dirty="0" smtClean="0"/>
-              <a:t>To present all relevant information in a clear and understandable system/hierarchy</a:t>
-            </a:r>
+          </a:p>
+          <a:p>
+            <a:r>
+              <a:rPr lang="en-CA" sz="2400" dirty="0" smtClean="0"/>
+              <a:t>To present all relevant information in a clear and understandable </a:t>
+            </a:r>
+            <a:r>
+              <a:rPr lang="en-CA" sz="2400" dirty="0" smtClean="0"/>
+              <a:t>system/hierarchy</a:t>
+            </a:r>
+          </a:p>
+          <a:p>
+            <a:r>
+              <a:rPr lang="en-CA" sz="2400" dirty="0" smtClean="0"/>
+              <a:t>Create a flexible structure that can accommodate growing contents (iOS, TURN, etc.)</a:t>
+            </a:r>
+            <a:endParaRPr lang="en-CA" sz="2400" dirty="0" smtClean="0"/>
           </a:p>
         </p:txBody>
       </p:sp>
@@ -8027,8 +8052,8 @@
         </p:nvSpPr>
         <p:spPr>
           <a:xfrm>
-            <a:off x="2321661" y="5354618"/>
-            <a:ext cx="4726102" cy="954107"/>
+            <a:off x="762000" y="5486400"/>
+            <a:ext cx="8248155" cy="954107"/>
           </a:xfrm>
           <a:prstGeom prst="rect">
             <a:avLst/>
@@ -8042,31 +8067,28 @@
           <a:lstStyle/>
           <a:p>
             <a:r>
+              <a:rPr lang="en-CA" altLang="ja-JP" sz="2800" dirty="0" smtClean="0"/>
+              <a:t>To clearly present </a:t>
+            </a:r>
+            <a:r>
+              <a:rPr lang="en-CA" altLang="ja-JP" sz="2800" dirty="0" err="1" smtClean="0"/>
+              <a:t>SkyWay’s</a:t>
+            </a:r>
+            <a:r>
+              <a:rPr lang="en-CA" altLang="ja-JP" sz="2800" dirty="0" smtClean="0"/>
+              <a:t> strengths and provide</a:t>
+            </a:r>
+          </a:p>
+          <a:p>
+            <a:r>
               <a:rPr lang="en-CA" altLang="ja-JP" sz="2800" dirty="0"/>
-              <a:t>To revamp the </a:t>
-            </a:r>
-            <a:r>
-              <a:rPr lang="en-CA" altLang="ja-JP" sz="2800" dirty="0" err="1"/>
-              <a:t>SkyWay</a:t>
-            </a:r>
-            <a:r>
-              <a:rPr lang="en-CA" altLang="ja-JP" sz="2800" dirty="0"/>
-              <a:t> </a:t>
+              <a:t>e</a:t>
             </a:r>
             <a:r>
               <a:rPr lang="en-CA" altLang="ja-JP" sz="2800" dirty="0" smtClean="0"/>
-              <a:t>website</a:t>
-            </a:r>
-          </a:p>
-          <a:p>
-            <a:r>
-              <a:rPr lang="en-CA" altLang="ja-JP" sz="2800" dirty="0" smtClean="0"/>
-              <a:t>to </a:t>
-            </a:r>
-            <a:r>
-              <a:rPr lang="en-CA" altLang="ja-JP" sz="2800" dirty="0"/>
-              <a:t>a fresh and appealing design</a:t>
-            </a:r>
+              <a:t>asy access to all the resources that developers will use</a:t>
+            </a:r>
+            <a:endParaRPr lang="en-CA" altLang="ja-JP" sz="2800" dirty="0"/>
           </a:p>
         </p:txBody>
       </p:sp>
@@ -8135,10 +8157,15 @@
             <p:ph idx="1"/>
           </p:nvPr>
         </p:nvSpPr>
-        <p:spPr/>
+        <p:spPr>
+          <a:xfrm>
+            <a:off x="457200" y="1600200"/>
+            <a:ext cx="8229600" cy="5105400"/>
+          </a:xfrm>
+        </p:spPr>
         <p:txBody>
           <a:bodyPr>
-            <a:normAutofit fontScale="92500" lnSpcReduction="10000"/>
+            <a:normAutofit fontScale="92500" lnSpcReduction="20000"/>
           </a:bodyPr>
           <a:lstStyle/>
           <a:p>
@@ -8152,7 +8179,15 @@
                   <a:srgbClr val="008000"/>
                 </a:solidFill>
               </a:rPr>
-              <a:t>developers and users</a:t>
+              <a:t>developers </a:t>
+            </a:r>
+            <a:r>
+              <a:rPr lang="en-CA" dirty="0" smtClean="0">
+                <a:solidFill>
+                  <a:srgbClr val="008000"/>
+                </a:solidFill>
+              </a:rPr>
+              <a:t>ranging from large-corporations to independent developers</a:t>
             </a:r>
             <a:endParaRPr lang="en-CA" dirty="0" smtClean="0">
               <a:solidFill>
@@ -8171,7 +8206,31 @@
                   <a:srgbClr val="008000"/>
                 </a:solidFill>
               </a:rPr>
-              <a:t>are interested in real-time web communication.</a:t>
+              <a:t>are interested in </a:t>
+            </a:r>
+            <a:r>
+              <a:rPr lang="en-CA" dirty="0" smtClean="0">
+                <a:solidFill>
+                  <a:srgbClr val="008000"/>
+                </a:solidFill>
+              </a:rPr>
+              <a:t>developing a </a:t>
+            </a:r>
+            <a:r>
+              <a:rPr lang="en-CA" dirty="0" err="1" smtClean="0">
+                <a:solidFill>
+                  <a:srgbClr val="008000"/>
+                </a:solidFill>
+              </a:rPr>
+              <a:t>WebRTC</a:t>
+            </a:r>
+            <a:r>
+              <a:rPr lang="en-CA" dirty="0" smtClean="0">
+                <a:solidFill>
+                  <a:srgbClr val="008000"/>
+                </a:solidFill>
+              </a:rPr>
+              <a:t> service or application</a:t>
             </a:r>
             <a:endParaRPr lang="en-CA" dirty="0" smtClean="0">
               <a:solidFill>
@@ -8190,15 +8249,7 @@
                   <a:srgbClr val="008000"/>
                 </a:solidFill>
               </a:rPr>
-              <a:t>N</a:t>
-            </a:r>
-            <a:r>
-              <a:rPr lang="en-CA" dirty="0" smtClean="0">
-                <a:solidFill>
-                  <a:srgbClr val="008000"/>
-                </a:solidFill>
-              </a:rPr>
-              <a:t>EW </a:t>
+              <a:t>NEW </a:t>
             </a:r>
             <a:r>
               <a:rPr lang="en-CA" dirty="0" err="1" smtClean="0">
@@ -8216,16 +8267,15 @@
               </a:rPr>
               <a:t> website</a:t>
             </a:r>
-            <a:endParaRPr lang="en-CA" dirty="0" smtClean="0">
-              <a:solidFill>
-                <a:srgbClr val="008000"/>
-              </a:solidFill>
-            </a:endParaRPr>
           </a:p>
           <a:p>
             <a:r>
               <a:rPr lang="en-CA" dirty="0" smtClean="0"/>
-              <a:t>is a </a:t>
+              <a:t>is </a:t>
+            </a:r>
+            <a:r>
+              <a:rPr lang="en-CA" dirty="0" smtClean="0"/>
+              <a:t>an </a:t>
             </a:r>
             <a:r>
               <a:rPr lang="en-CA" dirty="0" smtClean="0">
@@ -8233,7 +8283,7 @@
                   <a:srgbClr val="008000"/>
                 </a:solidFill>
               </a:rPr>
-              <a:t>website</a:t>
+              <a:t>improved website</a:t>
             </a:r>
             <a:endParaRPr lang="en-CA" dirty="0" smtClean="0">
               <a:solidFill>
@@ -8283,26 +8333,7 @@
                   <a:srgbClr val="008000"/>
                 </a:solidFill>
               </a:rPr>
-              <a:t>websites</a:t>
-            </a:r>
-            <a:endParaRPr lang="en-CA" dirty="0" smtClean="0">
-              <a:solidFill>
-                <a:srgbClr val="008000"/>
-              </a:solidFill>
-            </a:endParaRPr>
-          </a:p>
-          <a:p>
-            <a:r>
-              <a:rPr lang="en-CA" dirty="0" smtClean="0"/>
-              <a:t>our project </a:t>
-            </a:r>
-            <a:r>
-              <a:rPr lang="en-CA" dirty="0" smtClean="0">
-                <a:solidFill>
-                  <a:srgbClr val="008000"/>
-                </a:solidFill>
-              </a:rPr>
-              <a:t>will be a new website for </a:t>
+              <a:t>the current </a:t>
             </a:r>
             <a:r>
               <a:rPr lang="en-CA" dirty="0" err="1" smtClean="0">
@@ -8318,7 +8349,58 @@
                   <a:srgbClr val="008000"/>
                 </a:solidFill>
               </a:rPr>
-              <a:t>.</a:t>
+              <a:t> website</a:t>
+            </a:r>
+            <a:endParaRPr lang="en-CA" dirty="0" smtClean="0">
+              <a:solidFill>
+                <a:srgbClr val="008000"/>
+              </a:solidFill>
+            </a:endParaRPr>
+          </a:p>
+          <a:p>
+            <a:r>
+              <a:rPr lang="en-CA" dirty="0" smtClean="0"/>
+              <a:t>our project </a:t>
+            </a:r>
+            <a:r>
+              <a:rPr lang="en-CA" dirty="0" smtClean="0">
+                <a:solidFill>
+                  <a:srgbClr val="008000"/>
+                </a:solidFill>
+              </a:rPr>
+              <a:t>clearly explains </a:t>
+            </a:r>
+            <a:r>
+              <a:rPr lang="en-CA" dirty="0" err="1" smtClean="0">
+                <a:solidFill>
+                  <a:srgbClr val="008000"/>
+                </a:solidFill>
+              </a:rPr>
+              <a:t>SkyWay’s</a:t>
+            </a:r>
+            <a:r>
+              <a:rPr lang="en-CA" dirty="0" smtClean="0">
+                <a:solidFill>
+                  <a:srgbClr val="008000"/>
+                </a:solidFill>
+              </a:rPr>
+              <a:t> strengths and </a:t>
+            </a:r>
+            <a:r>
+              <a:rPr lang="en-CA" altLang="ja-JP" dirty="0" smtClean="0">
+                <a:solidFill>
+                  <a:srgbClr val="008000"/>
+                </a:solidFill>
+              </a:rPr>
+              <a:t>houses all </a:t>
+            </a:r>
+            <a:r>
+              <a:rPr lang="en-CA" dirty="0" smtClean="0">
+                <a:solidFill>
+                  <a:srgbClr val="008000"/>
+                </a:solidFill>
+              </a:rPr>
+              <a:t>essential and useful resources in a well-defined organisation.</a:t>
             </a:r>
             <a:endParaRPr lang="en-CA" dirty="0"/>
           </a:p>
@@ -8364,8 +8446,8 @@
         </p:nvSpPr>
         <p:spPr>
           <a:xfrm>
-            <a:off x="2667000" y="1524000"/>
-            <a:ext cx="3810000" cy="5029200"/>
+            <a:off x="2667000" y="1447800"/>
+            <a:ext cx="3810000" cy="5334000"/>
           </a:xfrm>
           <a:prstGeom prst="rect">
             <a:avLst/>
@@ -8433,7 +8515,7 @@
         </p:nvSpPr>
         <p:spPr>
           <a:xfrm>
-            <a:off x="2895829" y="1808818"/>
+            <a:off x="2895829" y="1524000"/>
             <a:ext cx="3504742" cy="523220"/>
           </a:xfrm>
           <a:prstGeom prst="rect">
@@ -8471,8 +8553,8 @@
         </p:nvSpPr>
         <p:spPr>
           <a:xfrm>
-            <a:off x="3124200" y="2514600"/>
-            <a:ext cx="3048000" cy="1524000"/>
+            <a:off x="3124200" y="2133600"/>
+            <a:ext cx="3048000" cy="1436132"/>
           </a:xfrm>
           <a:prstGeom prst="rect">
             <a:avLst/>
@@ -8514,8 +8596,8 @@
         </p:nvSpPr>
         <p:spPr>
           <a:xfrm>
-            <a:off x="3141729" y="4104558"/>
-            <a:ext cx="3012941" cy="523220"/>
+            <a:off x="2806315" y="3653135"/>
+            <a:ext cx="3670685" cy="461665"/>
           </a:xfrm>
           <a:prstGeom prst="rect">
             <a:avLst/>
@@ -8529,14 +8611,10 @@
           <a:lstStyle/>
           <a:p>
             <a:r>
-              <a:rPr lang="en-CA" sz="2800" dirty="0" err="1" smtClean="0"/>
-              <a:t>SkyWay</a:t>
-            </a:r>
-            <a:r>
-              <a:rPr lang="en-CA" sz="2800" dirty="0" smtClean="0"/>
-              <a:t>, but newer.</a:t>
-            </a:r>
-            <a:endParaRPr lang="en-CA" sz="2800" dirty="0"/>
+              <a:rPr lang="en-CA" sz="2400" dirty="0" smtClean="0"/>
+              <a:t>Our new &amp; improved home.</a:t>
+            </a:r>
+            <a:endParaRPr lang="en-CA" sz="2400" dirty="0"/>
           </a:p>
         </p:txBody>
       </p:sp>
@@ -8548,8 +8626,8 @@
         </p:nvSpPr>
         <p:spPr>
           <a:xfrm>
-            <a:off x="3561422" y="4658380"/>
-            <a:ext cx="2028312" cy="523220"/>
+            <a:off x="2888275" y="4114800"/>
+            <a:ext cx="3436325" cy="646331"/>
           </a:xfrm>
           <a:prstGeom prst="rect">
             <a:avLst/>
@@ -8562,11 +8640,31 @@
           </a:bodyPr>
           <a:lstStyle/>
           <a:p>
-            <a:r>
-              <a:rPr lang="en-CA" sz="2800" dirty="0" smtClean="0"/>
-              <a:t>New Design!</a:t>
-            </a:r>
-            <a:endParaRPr lang="en-CA" sz="2800" dirty="0"/>
+            <a:pPr algn="ctr"/>
+            <a:r>
+              <a:rPr lang="en-CA" dirty="0" smtClean="0"/>
+              <a:t>Find out how</a:t>
+            </a:r>
+            <a:r>
+              <a:rPr lang="en-CA" dirty="0" smtClean="0"/>
+              <a:t> </a:t>
+            </a:r>
+            <a:r>
+              <a:rPr lang="en-CA" dirty="0" err="1" smtClean="0"/>
+              <a:t>SkyWay</a:t>
+            </a:r>
+            <a:r>
+              <a:rPr lang="en-CA" dirty="0" smtClean="0"/>
+              <a:t> will help you</a:t>
+            </a:r>
+          </a:p>
+          <a:p>
+            <a:pPr algn="ctr"/>
+            <a:r>
+              <a:rPr lang="en-CA" dirty="0" smtClean="0"/>
+              <a:t>Build your latest great app</a:t>
+            </a:r>
+            <a:endParaRPr lang="en-CA" dirty="0"/>
           </a:p>
         </p:txBody>
       </p:sp>
@@ -8578,8 +8676,8 @@
         </p:nvSpPr>
         <p:spPr>
           <a:xfrm>
-            <a:off x="3561422" y="5115580"/>
-            <a:ext cx="2303964" cy="523220"/>
+            <a:off x="2743200" y="4800600"/>
+            <a:ext cx="3716915" cy="369332"/>
           </a:xfrm>
           <a:prstGeom prst="rect">
             <a:avLst/>
@@ -8593,10 +8691,22 @@
           <a:lstStyle/>
           <a:p>
             <a:r>
-              <a:rPr lang="en-CA" sz="2800" dirty="0" smtClean="0"/>
-              <a:t>New Features!</a:t>
-            </a:r>
-            <a:endParaRPr lang="en-CA" sz="2800" dirty="0"/>
+              <a:rPr lang="en-CA" altLang="ja-JP" dirty="0"/>
+              <a:t>Learn </a:t>
+            </a:r>
+            <a:r>
+              <a:rPr lang="en-CA" altLang="ja-JP"/>
+              <a:t>about </a:t>
+            </a:r>
+            <a:r>
+              <a:rPr lang="en-CA" altLang="ja-JP" smtClean="0"/>
+              <a:t>our JS</a:t>
+            </a:r>
+            <a:r>
+              <a:rPr lang="en-CA" altLang="ja-JP" dirty="0"/>
+              <a:t>, iOS, Android SDKs</a:t>
+            </a:r>
+            <a:endParaRPr lang="en-CA" altLang="ja-JP" dirty="0"/>
           </a:p>
         </p:txBody>
       </p:sp>
@@ -8608,8 +8718,8 @@
         </p:nvSpPr>
         <p:spPr>
           <a:xfrm>
-            <a:off x="3561422" y="5572780"/>
-            <a:ext cx="2148858" cy="523220"/>
+            <a:off x="2888275" y="5257800"/>
+            <a:ext cx="3436325" cy="646331"/>
           </a:xfrm>
           <a:prstGeom prst="rect">
             <a:avLst/>
@@ -8617,16 +8727,17 @@
           <a:noFill/>
         </p:spPr>
         <p:txBody>
-          <a:bodyPr wrap="none" rtlCol="0">
+          <a:bodyPr wrap="square" rtlCol="0">
             <a:spAutoFit/>
           </a:bodyPr>
           <a:lstStyle/>
           <a:p>
-            <a:r>
-              <a:rPr lang="en-CA" sz="2800" dirty="0" smtClean="0"/>
-              <a:t>New Colours!</a:t>
-            </a:r>
-            <a:endParaRPr lang="en-CA" sz="2800" dirty="0"/>
+            <a:pPr algn="ctr"/>
+            <a:r>
+              <a:rPr lang="en-CA" dirty="0" smtClean="0"/>
+              <a:t>Easy access to helpful development resources</a:t>
+            </a:r>
+            <a:endParaRPr lang="en-CA" dirty="0"/>
           </a:p>
         </p:txBody>
       </p:sp>
@@ -8646,7 +8757,7 @@
         </p:blipFill>
         <p:spPr>
           <a:xfrm>
-            <a:off x="3466407" y="3387001"/>
+            <a:off x="3466407" y="3006001"/>
             <a:ext cx="2363583" cy="459509"/>
           </a:xfrm>
           <a:prstGeom prst="rect">
@@ -8676,7 +8787,7 @@
         </p:blipFill>
         <p:spPr>
           <a:xfrm>
-            <a:off x="5307908" y="2634529"/>
+            <a:off x="5307908" y="2253529"/>
             <a:ext cx="712583" cy="712583"/>
           </a:xfrm>
           <a:prstGeom prst="rect">
@@ -8684,6 +8795,48 @@
           </a:prstGeom>
         </p:spPr>
       </p:pic>
+      <p:sp>
+        <p:nvSpPr>
+          <p:cNvPr id="13" name="TextBox 8"/>
+          <p:cNvSpPr txBox="1"/>
+          <p:nvPr/>
+        </p:nvSpPr>
+        <p:spPr>
+          <a:xfrm>
+            <a:off x="2929326" y="5983069"/>
+            <a:ext cx="3242874" cy="646331"/>
+          </a:xfrm>
+          <a:prstGeom prst="rect">
+            <a:avLst/>
+          </a:prstGeom>
+          <a:noFill/>
+        </p:spPr>
+        <p:txBody>
+          <a:bodyPr wrap="none" rtlCol="0">
+            <a:spAutoFit/>
+          </a:bodyPr>
+          <a:lstStyle/>
+          <a:p>
+            <a:pPr algn="ctr"/>
+            <a:r>
+              <a:rPr lang="en-CA" dirty="0" smtClean="0"/>
+              <a:t>Try our demo apps and see what</a:t>
+            </a:r>
+          </a:p>
+          <a:p>
+            <a:pPr algn="ctr"/>
+            <a:r>
+              <a:rPr lang="en-CA" dirty="0"/>
+              <a:t>y</a:t>
+            </a:r>
+            <a:r>
+              <a:rPr lang="en-CA" dirty="0" smtClean="0"/>
+              <a:t>ou can do with Skyway!</a:t>
+            </a:r>
+            <a:endParaRPr lang="en-CA" dirty="0"/>
+          </a:p>
+        </p:txBody>
+      </p:sp>
     </p:spTree>
   </p:cSld>
   <p:clrMapOvr>
@@ -8837,14 +8990,14 @@
           <p:nvPr>
             <p:extLst>
               <p:ext uri="{D42A27DB-BD31-4B8C-83A1-F6EECF244321}">
-                <p14:modId xmlns:p14="http://schemas.microsoft.com/office/powerpoint/2010/main" val="821319300"/>
+                <p14:modId xmlns:p14="http://schemas.microsoft.com/office/powerpoint/2010/main" val="2126362173"/>
               </p:ext>
             </p:extLst>
           </p:nvPr>
         </p:nvGraphicFramePr>
         <p:xfrm>
-          <a:off x="381000" y="1295400"/>
-          <a:ext cx="8458200" cy="3073400"/>
+          <a:off x="381000" y="1219200"/>
+          <a:ext cx="8458200" cy="3302000"/>
         </p:xfrm>
         <a:graphic>
           <a:graphicData uri="http://schemas.openxmlformats.org/drawingml/2006/table">
@@ -8853,8 +9006,8 @@
                 <a:tableStyleId>{5C22544A-7EE6-4342-B048-85BDC9FD1C3A}</a:tableStyleId>
               </a:tblPr>
               <a:tblGrid>
-                <a:gridCol w="4229100"/>
-                <a:gridCol w="4229100"/>
+                <a:gridCol w="5029200"/>
+                <a:gridCol w="3429000"/>
               </a:tblGrid>
               <a:tr h="370840">
                 <a:tc>
@@ -8864,10 +9017,10 @@
                     <a:p>
                       <a:pPr algn="ctr"/>
                       <a:r>
-                        <a:rPr lang="en-CA" sz="3200" dirty="0" smtClean="0"/>
+                        <a:rPr lang="en-CA" sz="1400" dirty="0" smtClean="0"/>
                         <a:t>IN</a:t>
                       </a:r>
-                      <a:endParaRPr lang="en-CA" dirty="0"/>
+                      <a:endParaRPr lang="en-CA" sz="1400" dirty="0"/>
                     </a:p>
                   </a:txBody>
                   <a:tcPr/>
@@ -8879,10 +9032,10 @@
                     <a:p>
                       <a:pPr algn="ctr"/>
                       <a:r>
-                        <a:rPr lang="en-CA" sz="2800" dirty="0" smtClean="0"/>
+                        <a:rPr lang="en-CA" sz="1400" dirty="0" smtClean="0"/>
                         <a:t>OUT</a:t>
                       </a:r>
-                      <a:endParaRPr lang="en-CA" dirty="0"/>
+                      <a:endParaRPr lang="en-CA" sz="1400" dirty="0"/>
                     </a:p>
                   </a:txBody>
                   <a:tcPr/>
@@ -8895,20 +9048,20 @@
                     <a:lstStyle/>
                     <a:p>
                       <a:r>
-                        <a:rPr lang="en-CA" dirty="0" smtClean="0"/>
+                        <a:rPr lang="en-CA" sz="1400" dirty="0" smtClean="0"/>
                         <a:t>Examination</a:t>
                       </a:r>
                       <a:r>
-                        <a:rPr lang="en-CA" baseline="0" dirty="0" smtClean="0"/>
+                        <a:rPr lang="en-CA" sz="1400" baseline="0" dirty="0" smtClean="0"/>
                         <a:t> of current situation</a:t>
                       </a:r>
                     </a:p>
                     <a:p>
                       <a:r>
-                        <a:rPr lang="en-CA" baseline="0" dirty="0" smtClean="0"/>
+                        <a:rPr lang="en-CA" sz="1400" baseline="0" dirty="0" smtClean="0"/>
                         <a:t>(Design and site stats)</a:t>
                       </a:r>
-                      <a:endParaRPr lang="en-CA" dirty="0"/>
+                      <a:endParaRPr lang="en-CA" sz="1400" dirty="0"/>
                     </a:p>
                   </a:txBody>
                   <a:tcPr/>
@@ -8919,18 +9072,180 @@
                     <a:lstStyle/>
                     <a:p>
                       <a:r>
-                        <a:rPr lang="en-CA" dirty="0" smtClean="0"/>
+                        <a:rPr lang="en-CA" sz="1400" dirty="0" smtClean="0"/>
                         <a:t>Creating websites other than </a:t>
                       </a:r>
                       <a:r>
-                        <a:rPr lang="en-CA" dirty="0" err="1" smtClean="0"/>
+                        <a:rPr lang="en-CA" sz="1400" dirty="0" err="1" smtClean="0"/>
                         <a:t>SkyWay’s</a:t>
                       </a:r>
                       <a:r>
-                        <a:rPr lang="en-CA" dirty="0" smtClean="0"/>
+                        <a:rPr lang="en-CA" sz="1400" dirty="0" smtClean="0"/>
                         <a:t>.</a:t>
                       </a:r>
-                      <a:endParaRPr lang="en-CA" dirty="0"/>
+                      <a:endParaRPr lang="en-CA" sz="1400" dirty="0"/>
+                    </a:p>
+                  </a:txBody>
+                  <a:tcPr/>
+                </a:tc>
+              </a:tr>
+              <a:tr h="274320">
+                <a:tc>
+                  <a:txBody>
+                    <a:bodyPr/>
+                    <a:lstStyle/>
+                    <a:p>
+                      <a:r>
+                        <a:rPr lang="en-CA" sz="1400" dirty="0" smtClean="0"/>
+                        <a:t>Establish </a:t>
+                      </a:r>
+                      <a:r>
+                        <a:rPr lang="en-CA" sz="1400" dirty="0" err="1" smtClean="0"/>
+                        <a:t>SkyWay</a:t>
+                      </a:r>
+                      <a:r>
+                        <a:rPr lang="en-CA" sz="1400" baseline="0" dirty="0" smtClean="0"/>
+                        <a:t> &amp; </a:t>
+                      </a:r>
+                      <a:r>
+                        <a:rPr lang="en-CA" sz="1400" baseline="0" dirty="0" err="1" smtClean="0"/>
+                        <a:t>WebCore</a:t>
+                      </a:r>
+                      <a:r>
+                        <a:rPr lang="en-CA" sz="1400" baseline="0" dirty="0" smtClean="0"/>
+                        <a:t> aims</a:t>
+                      </a:r>
+                      <a:endParaRPr lang="en-CA" sz="1400" dirty="0"/>
+                    </a:p>
+                  </a:txBody>
+                  <a:tcPr/>
+                </a:tc>
+                <a:tc>
+                  <a:txBody>
+                    <a:bodyPr/>
+                    <a:lstStyle/>
+                    <a:p>
+                      <a:endParaRPr lang="en-CA" sz="1400" dirty="0"/>
+                    </a:p>
+                  </a:txBody>
+                  <a:tcPr/>
+                </a:tc>
+              </a:tr>
+              <a:tr h="198120">
+                <a:tc>
+                  <a:txBody>
+                    <a:bodyPr/>
+                    <a:lstStyle/>
+                    <a:p>
+                      <a:r>
+                        <a:rPr lang="en-CA" sz="1400" dirty="0" smtClean="0"/>
+                        <a:t>Examination</a:t>
+                      </a:r>
+                      <a:r>
+                        <a:rPr lang="en-CA" sz="1400" baseline="0" dirty="0" smtClean="0"/>
+                        <a:t> of</a:t>
+                      </a:r>
+                      <a:r>
+                        <a:rPr lang="en-CA" sz="1400" dirty="0" smtClean="0"/>
+                        <a:t> Competitors/Related Sites</a:t>
+                      </a:r>
+                      <a:endParaRPr lang="en-CA" sz="1400" dirty="0"/>
+                    </a:p>
+                  </a:txBody>
+                  <a:tcPr/>
+                </a:tc>
+                <a:tc>
+                  <a:txBody>
+                    <a:bodyPr/>
+                    <a:lstStyle/>
+                    <a:p>
+                      <a:endParaRPr lang="en-CA" sz="1400"/>
+                    </a:p>
+                  </a:txBody>
+                  <a:tcPr/>
+                </a:tc>
+              </a:tr>
+              <a:tr h="274320">
+                <a:tc>
+                  <a:txBody>
+                    <a:bodyPr/>
+                    <a:lstStyle/>
+                    <a:p>
+                      <a:r>
+                        <a:rPr lang="en-CA" sz="1400" dirty="0" smtClean="0"/>
+                        <a:t>User Story</a:t>
+                      </a:r>
+                      <a:r>
+                        <a:rPr lang="en-CA" sz="1400" baseline="0" dirty="0" smtClean="0"/>
+                        <a:t> Mapping</a:t>
+                      </a:r>
+                      <a:endParaRPr lang="en-CA" sz="1400" dirty="0"/>
+                    </a:p>
+                  </a:txBody>
+                  <a:tcPr/>
+                </a:tc>
+                <a:tc>
+                  <a:txBody>
+                    <a:bodyPr/>
+                    <a:lstStyle/>
+                    <a:p>
+                      <a:endParaRPr lang="en-CA" sz="1400"/>
+                    </a:p>
+                  </a:txBody>
+                  <a:tcPr/>
+                </a:tc>
+              </a:tr>
+              <a:tr h="274320">
+                <a:tc>
+                  <a:txBody>
+                    <a:bodyPr/>
+                    <a:lstStyle/>
+                    <a:p>
+                      <a:r>
+                        <a:rPr lang="en-CA" sz="1400" dirty="0" smtClean="0"/>
+                        <a:t>Paper prototyping</a:t>
+                      </a:r>
+                      <a:endParaRPr lang="en-CA" sz="1400" dirty="0"/>
+                    </a:p>
+                  </a:txBody>
+                  <a:tcPr/>
+                </a:tc>
+                <a:tc>
+                  <a:txBody>
+                    <a:bodyPr/>
+                    <a:lstStyle/>
+                    <a:p>
+                      <a:endParaRPr lang="en-CA" sz="1400" dirty="0"/>
+                    </a:p>
+                  </a:txBody>
+                  <a:tcPr/>
+                </a:tc>
+              </a:tr>
+              <a:tr h="274320">
+                <a:tc>
+                  <a:txBody>
+                    <a:bodyPr/>
+                    <a:lstStyle/>
+                    <a:p>
+                      <a:r>
+                        <a:rPr lang="en-CA" sz="1400" dirty="0" smtClean="0"/>
+                        <a:t>Update the design</a:t>
+                      </a:r>
+                      <a:r>
+                        <a:rPr lang="en-CA" sz="1400" baseline="0" dirty="0" smtClean="0"/>
+                        <a:t> of the site (clearly present growing contents)</a:t>
+                      </a:r>
+                      <a:endParaRPr lang="en-CA" sz="1400" dirty="0"/>
+                    </a:p>
+                  </a:txBody>
+                  <a:tcPr/>
+                </a:tc>
+                <a:tc>
+                  <a:txBody>
+                    <a:bodyPr/>
+                    <a:lstStyle/>
+                    <a:p>
+                      <a:endParaRPr lang="en-CA" sz="1400" dirty="0"/>
                     </a:p>
                   </a:txBody>
                   <a:tcPr/>
@@ -8943,26 +9258,22 @@
                     <a:lstStyle/>
                     <a:p>
                       <a:r>
-                        <a:rPr lang="en-CA" dirty="0" smtClean="0"/>
-                        <a:t>Establish </a:t>
+                        <a:rPr lang="en-CA" sz="1400" dirty="0" smtClean="0"/>
+                        <a:t>Improve the site contents</a:t>
                       </a:r>
                       <a:r>
-                        <a:rPr lang="en-CA" dirty="0" err="1" smtClean="0"/>
-                        <a:t>SkyWay</a:t>
+                        <a:rPr lang="en-CA" sz="1400" baseline="0" dirty="0" smtClean="0"/>
+                        <a:t> to explain </a:t>
                       </a:r>
                       <a:r>
-                        <a:rPr lang="en-CA" baseline="0" dirty="0" smtClean="0"/>
-                        <a:t> &amp; </a:t>
+                        <a:rPr lang="en-CA" sz="1400" baseline="0" dirty="0" err="1" smtClean="0"/>
+                        <a:t>SkyWay’s</a:t>
                       </a:r>
                       <a:r>
-                        <a:rPr lang="en-CA" baseline="0" dirty="0" err="1" smtClean="0"/>
-                        <a:t>WebCore</a:t>
+                        <a:rPr lang="en-CA" sz="1400" baseline="0" dirty="0" smtClean="0"/>
+                        <a:t> strengths and offer easy access to development resources.</a:t>
                       </a:r>
-                      <a:r>
-                        <a:rPr lang="en-CA" baseline="0" dirty="0" smtClean="0"/>
-                        <a:t> aims</a:t>
-                      </a:r>
-                      <a:endParaRPr lang="en-CA" dirty="0"/>
+                      <a:endParaRPr lang="en-CA" sz="1400" dirty="0"/>
                     </a:p>
                   </a:txBody>
                   <a:tcPr/>
@@ -8972,7 +9283,7 @@
                     <a:bodyPr/>
                     <a:lstStyle/>
                     <a:p>
-                      <a:endParaRPr lang="en-CA" dirty="0"/>
+                      <a:endParaRPr lang="en-CA" sz="1400" dirty="0"/>
                     </a:p>
                   </a:txBody>
                   <a:tcPr/>
@@ -8984,19 +9295,7 @@
                     <a:bodyPr/>
                     <a:lstStyle/>
                     <a:p>
-                      <a:r>
-                        <a:rPr lang="en-CA" dirty="0" smtClean="0"/>
-                        <a:t>Examination</a:t>
-                      </a:r>
-                      <a:r>
-                        <a:rPr lang="en-CA" baseline="0" dirty="0" smtClean="0"/>
-                        <a:t> of</a:t>
-                      </a:r>
-                      <a:r>
-                        <a:rPr lang="en-CA" dirty="0" smtClean="0"/>
-                        <a:t> Competitors/Related Sites</a:t>
-                      </a:r>
-                      <a:endParaRPr lang="en-CA" dirty="0"/>
+                      <a:endParaRPr lang="en-CA" sz="1400" dirty="0"/>
                     </a:p>
                   </a:txBody>
                   <a:tcPr/>
@@ -9006,85 +9305,7 @@
                     <a:bodyPr/>
                     <a:lstStyle/>
                     <a:p>
-                      <a:endParaRPr lang="en-CA"/>
-                    </a:p>
-                  </a:txBody>
-                  <a:tcPr/>
-                </a:tc>
-              </a:tr>
-              <a:tr h="370840">
-                <a:tc>
-                  <a:txBody>
-                    <a:bodyPr/>
-                    <a:lstStyle/>
-                    <a:p>
-                      <a:r>
-                        <a:rPr lang="en-CA" dirty="0" smtClean="0"/>
-                        <a:t>User Story</a:t>
-                      </a:r>
-                      <a:r>
-                        <a:rPr lang="en-CA" baseline="0" dirty="0" smtClean="0"/>
-                        <a:t> Mapping</a:t>
-                      </a:r>
-                      <a:endParaRPr lang="en-CA" dirty="0"/>
-                    </a:p>
-                  </a:txBody>
-                  <a:tcPr/>
-                </a:tc>
-                <a:tc>
-                  <a:txBody>
-                    <a:bodyPr/>
-                    <a:lstStyle/>
-                    <a:p>
-                      <a:endParaRPr lang="en-CA"/>
-                    </a:p>
-                  </a:txBody>
-                  <a:tcPr/>
-                </a:tc>
-              </a:tr>
-              <a:tr h="370840">
-                <a:tc>
-                  <a:txBody>
-                    <a:bodyPr/>
-                    <a:lstStyle/>
-                    <a:p>
-                      <a:r>
-                        <a:rPr lang="en-CA" dirty="0" smtClean="0"/>
-                        <a:t>Paper prototyping</a:t>
-                      </a:r>
-                      <a:endParaRPr lang="en-CA" dirty="0"/>
-                    </a:p>
-                  </a:txBody>
-                  <a:tcPr/>
-                </a:tc>
-                <a:tc>
-                  <a:txBody>
-                    <a:bodyPr/>
-                    <a:lstStyle/>
-                    <a:p>
-                      <a:endParaRPr lang="en-CA"/>
-                    </a:p>
-                  </a:txBody>
-                  <a:tcPr/>
-                </a:tc>
-              </a:tr>
-              <a:tr h="370840">
-                <a:tc>
-                  <a:txBody>
-                    <a:bodyPr/>
-                    <a:lstStyle/>
-                    <a:p>
-                      <a:endParaRPr lang="en-CA" dirty="0"/>
-                    </a:p>
-                  </a:txBody>
-                  <a:tcPr/>
-                </a:tc>
-                <a:tc>
-                  <a:txBody>
-                    <a:bodyPr/>
-                    <a:lstStyle/>
-                    <a:p>
-                      <a:endParaRPr lang="en-CA" dirty="0"/>
+                      <a:endParaRPr lang="en-CA" sz="1400" dirty="0"/>
                     </a:p>
                   </a:txBody>
                   <a:tcPr/>
@@ -9103,13 +9324,13 @@
           <p:nvPr>
             <p:extLst>
               <p:ext uri="{D42A27DB-BD31-4B8C-83A1-F6EECF244321}">
-                <p14:modId xmlns:p14="http://schemas.microsoft.com/office/powerpoint/2010/main" val="627200707"/>
+                <p14:modId xmlns:p14="http://schemas.microsoft.com/office/powerpoint/2010/main" val="1579059895"/>
               </p:ext>
             </p:extLst>
           </p:nvPr>
         </p:nvGraphicFramePr>
         <p:xfrm>
-          <a:off x="381000" y="4572000"/>
+          <a:off x="381000" y="4648200"/>
           <a:ext cx="8458200" cy="2042160"/>
         </p:xfrm>
         <a:graphic>
@@ -9146,11 +9367,7 @@
                     <a:p>
                       <a:r>
                         <a:rPr lang="en-CA" dirty="0" smtClean="0"/>
-                        <a:t>Which frameworks/</a:t>
-                      </a:r>
-                      <a:r>
-                        <a:rPr lang="en-CA" baseline="0" dirty="0" smtClean="0"/>
-                        <a:t>technologies to use</a:t>
+                        <a:t>Which languages to use (likely HTML, CSS, JS)</a:t>
                       </a:r>
                       <a:endParaRPr lang="en-CA" dirty="0"/>
                     </a:p>
@@ -9164,11 +9381,48 @@
                     <a:bodyPr/>
                     <a:lstStyle/>
                     <a:p>
+                      <a:pPr marL="0" marR="0" indent="0" algn="l" defTabSz="914400" rtl="0" eaLnBrk="1" fontAlgn="auto" latinLnBrk="0" hangingPunct="1">
+                        <a:lnSpc>
+                          <a:spcPct val="100000"/>
+                        </a:lnSpc>
+                        <a:spcBef>
+                          <a:spcPts val="0"/>
+                        </a:spcBef>
+                        <a:spcAft>
+                          <a:spcPts val="0"/>
+                        </a:spcAft>
+                        <a:buClrTx/>
+                        <a:buSzTx/>
+                        <a:buFontTx/>
+                        <a:buNone/>
+                        <a:tabLst/>
+                        <a:defRPr/>
+                      </a:pPr>
                       <a:r>
-                        <a:rPr lang="en-CA" dirty="0" smtClean="0"/>
-                        <a:t>COLOURS!</a:t>
+                        <a:rPr lang="en-CA" altLang="ja-JP" dirty="0" smtClean="0"/>
+                        <a:t>Which frameworks/</a:t>
                       </a:r>
-                      <a:endParaRPr lang="en-CA" dirty="0"/>
+                      <a:r>
+                        <a:rPr lang="en-CA" altLang="ja-JP" baseline="0" dirty="0" smtClean="0"/>
+                        <a:t>technologies to use (</a:t>
+                      </a:r>
+                      <a:r>
+                        <a:rPr lang="en-CA" altLang="ja-JP" baseline="0" dirty="0" err="1" smtClean="0"/>
+                        <a:t>Peer.js</a:t>
+                      </a:r>
+                      <a:r>
+                        <a:rPr lang="en-CA" altLang="ja-JP" baseline="0" dirty="0" smtClean="0"/>
+                        <a:t>, </a:t>
+                      </a:r>
+                      <a:r>
+                        <a:rPr lang="en-CA" altLang="ja-JP" baseline="0" dirty="0" err="1" smtClean="0"/>
+                        <a:t>skyway.js</a:t>
+                      </a:r>
+                      <a:r>
+                        <a:rPr lang="en-CA" altLang="ja-JP" baseline="0" dirty="0" smtClean="0"/>
+                        <a:t>)</a:t>
+                      </a:r>
+                      <a:endParaRPr lang="en-CA" altLang="ja-JP" dirty="0" smtClean="0"/>
                     </a:p>
                   </a:txBody>
                   <a:tcPr/>
@@ -9351,7 +9605,7 @@
         </p:nvSpPr>
         <p:spPr bwMode="auto">
           <a:xfrm>
-            <a:off x="3809386" y="4342154"/>
+            <a:off x="3509101" y="4492666"/>
             <a:ext cx="4078424" cy="630942"/>
           </a:xfrm>
           <a:prstGeom prst="rect">
@@ -9373,7 +9627,7 @@
           <a:p>
             <a:pPr algn="l"/>
             <a:r>
-              <a:rPr lang="en-US" sz="3600" smtClean="0">
+              <a:rPr lang="en-US" sz="3600" dirty="0" smtClean="0">
                 <a:solidFill>
                   <a:schemeClr val="tx1"/>
                 </a:solidFill>
@@ -9502,51 +9756,6 @@
       </p:sp>
       <p:sp>
         <p:nvSpPr>
-          <p:cNvPr id="20" name="Rectangle 7"/>
-          <p:cNvSpPr>
-            <a:spLocks/>
-          </p:cNvSpPr>
-          <p:nvPr/>
-        </p:nvSpPr>
-        <p:spPr bwMode="auto">
-          <a:xfrm>
-            <a:off x="6415087" y="1716173"/>
-            <a:ext cx="2271713" cy="431800"/>
-          </a:xfrm>
-          <a:prstGeom prst="rect">
-            <a:avLst/>
-          </a:prstGeom>
-          <a:noFill/>
-          <a:ln w="12700" cap="rnd">
-            <a:noFill/>
-            <a:round/>
-            <a:headEnd type="none" w="med" len="med"/>
-            <a:tailEnd type="none" w="med" len="med"/>
-          </a:ln>
-        </p:spPr>
-        <p:txBody>
-          <a:bodyPr wrap="none" lIns="38100" tIns="38100" rIns="38100" bIns="38100">
-            <a:spAutoFit/>
-          </a:bodyPr>
-          <a:lstStyle/>
-          <a:p>
-            <a:pPr algn="l"/>
-            <a:r>
-              <a:rPr lang="en-US" sz="2800" dirty="0">
-                <a:solidFill>
-                  <a:schemeClr val="tx1"/>
-                </a:solidFill>
-                <a:latin typeface="Calibri" charset="0"/>
-                <a:cs typeface="Calibri" charset="0"/>
-                <a:sym typeface="Calibri" charset="0"/>
-              </a:rPr>
-              <a:t>Everyone else !</a:t>
-            </a:r>
-          </a:p>
-        </p:txBody>
-      </p:sp>
-      <p:sp>
-        <p:nvSpPr>
           <p:cNvPr id="21" name="Rectangle 8"/>
           <p:cNvSpPr>
             <a:spLocks/>
@@ -9555,7 +9764,7 @@
         </p:nvSpPr>
         <p:spPr bwMode="auto">
           <a:xfrm>
-            <a:off x="892313" y="6146631"/>
+            <a:off x="49471" y="6309776"/>
             <a:ext cx="5830887" cy="482600"/>
           </a:xfrm>
           <a:prstGeom prst="rect">
@@ -9607,7 +9816,7 @@
         </p:blipFill>
         <p:spPr bwMode="auto">
           <a:xfrm>
-            <a:off x="7932181" y="4234028"/>
+            <a:off x="7890217" y="4192698"/>
             <a:ext cx="800100" cy="927100"/>
           </a:xfrm>
           <a:prstGeom prst="rect">
@@ -9749,7 +9958,7 @@
         </p:nvSpPr>
         <p:spPr bwMode="auto">
           <a:xfrm>
-            <a:off x="3505200" y="5258538"/>
+            <a:off x="4394151" y="5246396"/>
             <a:ext cx="4686796" cy="630942"/>
           </a:xfrm>
           <a:prstGeom prst="rect">
@@ -9792,6 +10001,144 @@
           </a:p>
         </p:txBody>
       </p:sp>
+      <p:sp>
+        <p:nvSpPr>
+          <p:cNvPr id="26" name="Rectangle 6"/>
+          <p:cNvSpPr>
+            <a:spLocks/>
+          </p:cNvSpPr>
+          <p:nvPr/>
+        </p:nvSpPr>
+        <p:spPr bwMode="auto">
+          <a:xfrm>
+            <a:off x="2508059" y="2297059"/>
+            <a:ext cx="913712" cy="630942"/>
+          </a:xfrm>
+          <a:prstGeom prst="rect">
+            <a:avLst/>
+          </a:prstGeom>
+          <a:noFill/>
+          <a:ln w="12700" cap="rnd">
+            <a:noFill/>
+            <a:round/>
+            <a:headEnd type="none" w="med" len="med"/>
+            <a:tailEnd type="none" w="med" len="med"/>
+          </a:ln>
+        </p:spPr>
+        <p:txBody>
+          <a:bodyPr wrap="none" lIns="38100" tIns="38100" rIns="38100" bIns="38100">
+            <a:spAutoFit/>
+          </a:bodyPr>
+          <a:lstStyle/>
+          <a:p>
+            <a:pPr algn="l"/>
+            <a:r>
+              <a:rPr lang="en-US" sz="3600" smtClean="0">
+                <a:solidFill>
+                  <a:schemeClr val="tx1"/>
+                </a:solidFill>
+                <a:latin typeface="Calibri" charset="0"/>
+                <a:cs typeface="Calibri" charset="0"/>
+                <a:sym typeface="Calibri" charset="0"/>
+              </a:rPr>
+              <a:t>V&amp;V</a:t>
+            </a:r>
+            <a:endParaRPr lang="en-US" sz="3600" dirty="0">
+              <a:solidFill>
+                <a:schemeClr val="tx1"/>
+              </a:solidFill>
+              <a:latin typeface="Calibri" charset="0"/>
+              <a:cs typeface="Calibri" charset="0"/>
+              <a:sym typeface="Calibri" charset="0"/>
+            </a:endParaRPr>
+          </a:p>
+        </p:txBody>
+      </p:sp>
+      <p:sp>
+        <p:nvSpPr>
+          <p:cNvPr id="27" name="Rectangle 6"/>
+          <p:cNvSpPr>
+            <a:spLocks/>
+          </p:cNvSpPr>
+          <p:nvPr/>
+        </p:nvSpPr>
+        <p:spPr bwMode="auto">
+          <a:xfrm>
+            <a:off x="5992230" y="2139753"/>
+            <a:ext cx="1461939" cy="630942"/>
+          </a:xfrm>
+          <a:prstGeom prst="rect">
+            <a:avLst/>
+          </a:prstGeom>
+          <a:noFill/>
+          <a:ln w="12700" cap="rnd">
+            <a:noFill/>
+            <a:round/>
+            <a:headEnd type="none" w="med" len="med"/>
+            <a:tailEnd type="none" w="med" len="med"/>
+          </a:ln>
+        </p:spPr>
+        <p:txBody>
+          <a:bodyPr wrap="none" lIns="38100" tIns="38100" rIns="38100" bIns="38100">
+            <a:spAutoFit/>
+          </a:bodyPr>
+          <a:lstStyle/>
+          <a:p>
+            <a:r>
+              <a:rPr lang="ja-JP" altLang="en-US" sz="3600" dirty="0"/>
+              <a:t>時雨堂</a:t>
+            </a:r>
+            <a:endParaRPr lang="en-US" sz="3600" dirty="0">
+              <a:solidFill>
+                <a:schemeClr val="tx1"/>
+              </a:solidFill>
+              <a:latin typeface="Calibri" charset="0"/>
+              <a:cs typeface="Calibri" charset="0"/>
+              <a:sym typeface="Calibri" charset="0"/>
+            </a:endParaRPr>
+          </a:p>
+        </p:txBody>
+      </p:sp>
+      <p:pic>
+        <p:nvPicPr>
+          <p:cNvPr id="28" name="Picture 9"/>
+          <p:cNvPicPr>
+            <a:picLocks noChangeAspect="1" noChangeArrowheads="1"/>
+          </p:cNvPicPr>
+          <p:nvPr/>
+        </p:nvPicPr>
+        <p:blipFill>
+          <a:blip r:embed="rId3" cstate="print">
+            <a:duotone>
+              <a:prstClr val="black"/>
+              <a:schemeClr val="accent2">
+                <a:tint val="45000"/>
+                <a:satMod val="400000"/>
+              </a:schemeClr>
+            </a:duotone>
+          </a:blip>
+          <a:srcRect/>
+          <a:stretch>
+            <a:fillRect/>
+          </a:stretch>
+        </p:blipFill>
+        <p:spPr bwMode="auto">
+          <a:xfrm>
+            <a:off x="7630223" y="1252623"/>
+            <a:ext cx="800100" cy="927100"/>
+          </a:xfrm>
+          <a:prstGeom prst="rect">
+            <a:avLst/>
+          </a:prstGeom>
+          <a:noFill/>
+          <a:ln w="12700" cap="flat">
+            <a:noFill/>
+            <a:miter lim="800000"/>
+            <a:headEnd/>
+            <a:tailEnd/>
+          </a:ln>
+        </p:spPr>
+      </p:pic>
     </p:spTree>
   </p:cSld>
   <p:clrMapOvr>
@@ -10353,7 +10700,6 @@
               <a:rPr lang="en-CA" sz="2400" dirty="0" smtClean="0"/>
               <a:t> JQuery, Bootstrap</a:t>
             </a:r>
-            <a:endParaRPr lang="en-CA" sz="2400" dirty="0" smtClean="0"/>
           </a:p>
           <a:p>
             <a:pPr>
@@ -10382,7 +10728,6 @@
               <a:rPr lang="en-CA" sz="2400" dirty="0" smtClean="0"/>
               <a:t> Photoshop, Sketch</a:t>
             </a:r>
-            <a:endParaRPr lang="en-CA" sz="2400" dirty="0" smtClean="0"/>
           </a:p>
         </p:txBody>
       </p:sp>
@@ -10466,7 +10811,6 @@
               <a:rPr lang="en-CA" sz="3200" dirty="0" smtClean="0"/>
               <a:t>Other?</a:t>
             </a:r>
-            <a:endParaRPr lang="en-CA" sz="3200" dirty="0" smtClean="0"/>
           </a:p>
         </p:txBody>
       </p:sp>

</xml_diff>